<commit_message>
github address update; 04 fixed
</commit_message>
<xml_diff>
--- a/05-06 人造天体运动方程与二体问题积分.pptx
+++ b/05-06 人造天体运动方程与二体问题积分.pptx
@@ -245,7 +245,7 @@
           <a:p>
             <a:fld id="{26DDD1A4-63E9-4C41-BD0C-A6576214358F}" type="datetimeFigureOut">
               <a:rPr kumimoji="1" lang="zh-CN" altLang="en-US" smtClean="0"/>
-              <a:t>2024/4/3</a:t>
+              <a:t>2024/9/27</a:t>
             </a:fld>
             <a:endParaRPr kumimoji="1" lang="zh-CN" altLang="en-US"/>
           </a:p>
@@ -839,7 +839,7 @@
           <a:p>
             <a:fld id="{8664C608-40B1-4030-A28D-5B74BC98ADCE}" type="datetimeFigureOut">
               <a:rPr lang="en-US" smtClean="0"/>
-              <a:t>4/3/2024</a:t>
+              <a:t>9/27/2024</a:t>
             </a:fld>
             <a:endParaRPr lang="en-US" dirty="0"/>
           </a:p>
@@ -14088,8 +14088,8 @@
         </p:nvSpPr>
         <p:spPr>
           <a:xfrm>
-            <a:off x="6506678" y="5998650"/>
-            <a:ext cx="5541142" cy="584775"/>
+            <a:off x="6506678" y="5819070"/>
+            <a:ext cx="5541142" cy="830997"/>
           </a:xfrm>
           <a:prstGeom prst="rect">
             <a:avLst/>
@@ -14173,27 +14173,43 @@
             <a:r>
               <a:rPr lang="en-GB" altLang="zh-CN" sz="1600" b="1" dirty="0">
                 <a:solidFill>
-                  <a:srgbClr val="0000FF"/>
+                  <a:prstClr val="black"/>
                 </a:solidFill>
+                <a:latin typeface="Times New Roman" panose="02020603050405020304" pitchFamily="18" charset="0"/>
+                <a:ea typeface="微软雅黑" panose="020B0503020204020204" pitchFamily="34" charset="-122"/>
+                <a:cs typeface="Times New Roman" panose="02020603050405020304" pitchFamily="18" charset="0"/>
+                <a:sym typeface="+mn-ea"/>
+                <a:hlinkClick r:id="rId18"/>
+              </a:rPr>
+              <a:t>https://github.com/AsBackup/DAOSSA</a:t>
+            </a:r>
+            <a:r>
+              <a:rPr lang="en-GB" altLang="zh-CN" sz="1600" b="1" dirty="0">
+                <a:solidFill>
+                  <a:prstClr val="black"/>
+                </a:solidFill>
+                <a:latin typeface="Times New Roman" panose="02020603050405020304" pitchFamily="18" charset="0"/>
+                <a:ea typeface="微软雅黑" panose="020B0503020204020204" pitchFamily="34" charset="-122"/>
+                <a:cs typeface="Times New Roman" panose="02020603050405020304" pitchFamily="18" charset="0"/>
+                <a:sym typeface="+mn-ea"/>
+              </a:rPr>
+              <a:t> </a:t>
+            </a:r>
+            <a:r>
+              <a:rPr lang="en-GB" altLang="zh-CN" sz="1600" b="1" dirty="0">
                 <a:latin typeface="微软雅黑" panose="020B0503020204020204" pitchFamily="34" charset="-122"/>
                 <a:ea typeface="微软雅黑" panose="020B0503020204020204" pitchFamily="34" charset="-122"/>
               </a:rPr>
-              <a:t>.\DAOSSA\attachments</a:t>
+              <a:t>attachments</a:t>
             </a:r>
             <a:r>
               <a:rPr lang="en-US" altLang="zh-CN" sz="1600" b="1" dirty="0">
-                <a:solidFill>
-                  <a:srgbClr val="0000FF"/>
-                </a:solidFill>
                 <a:latin typeface="微软雅黑" panose="020B0503020204020204" pitchFamily="34" charset="-122"/>
                 <a:ea typeface="微软雅黑" panose="020B0503020204020204" pitchFamily="34" charset="-122"/>
               </a:rPr>
               <a:t>\Dimensionless.py</a:t>
             </a:r>
             <a:endParaRPr lang="zh-CN" sz="1600" b="1" dirty="0">
-              <a:solidFill>
-                <a:srgbClr val="0000FF"/>
-              </a:solidFill>
               <a:latin typeface="微软雅黑" panose="020B0503020204020204" pitchFamily="34" charset="-122"/>
               <a:ea typeface="微软雅黑" panose="020B0503020204020204" pitchFamily="34" charset="-122"/>
             </a:endParaRPr>
@@ -20894,30 +20910,12 @@
                 <a:ea typeface="微软雅黑" panose="020B0503020204020204" pitchFamily="34" charset="-122"/>
                 <a:cs typeface="Times New Roman" panose="02020603050405020304" pitchFamily="18" charset="0"/>
                 <a:sym typeface="+mn-ea"/>
-                <a:hlinkClick r:id="rId2"/>
-              </a:rPr>
-              <a:t>https://git.nddc.pmo.ac.cn/linhouyuan/DAOSSA</a:t>
+                <a:hlinkClick r:id="rId3"/>
+              </a:rPr>
+              <a:t>https://github.com/AsBackup/DAOSSA</a:t>
             </a:r>
             <a:r>
               <a:rPr kumimoji="0" lang="en-GB" altLang="zh-CN" sz="2000" b="1" i="0" u="none" strike="noStrike" kern="1200" cap="none" spc="0" normalizeH="0" baseline="0" noProof="0" dirty="0">
-                <a:ln>
-                  <a:noFill/>
-                </a:ln>
-                <a:solidFill>
-                  <a:prstClr val="black"/>
-                </a:solidFill>
-                <a:effectLst/>
-                <a:uLnTx/>
-                <a:uFillTx/>
-                <a:latin typeface="Times New Roman" panose="02020603050405020304" pitchFamily="18" charset="0"/>
-                <a:ea typeface="微软雅黑" panose="020B0503020204020204" pitchFamily="34" charset="-122"/>
-                <a:cs typeface="Times New Roman" panose="02020603050405020304" pitchFamily="18" charset="0"/>
-                <a:sym typeface="+mn-ea"/>
-              </a:rPr>
-              <a:t> </a:t>
-            </a:r>
-            <a:r>
-              <a:rPr kumimoji="0" lang="zh-CN" altLang="en-US" sz="2000" b="1" i="0" u="none" strike="noStrike" kern="1200" cap="none" spc="0" normalizeH="0" baseline="0" noProof="0" dirty="0">
                 <a:ln>
                   <a:noFill/>
                 </a:ln>
@@ -21059,30 +21057,12 @@
                 <a:ea typeface="微软雅黑" panose="020B0503020204020204" pitchFamily="34" charset="-122"/>
                 <a:cs typeface="Times New Roman" panose="02020603050405020304" pitchFamily="18" charset="0"/>
                 <a:sym typeface="+mn-ea"/>
-                <a:hlinkClick r:id="rId2"/>
-              </a:rPr>
-              <a:t>https://git.nddc.pmo.ac.cn/linhouyuan/DAOSSA</a:t>
+                <a:hlinkClick r:id="rId3"/>
+              </a:rPr>
+              <a:t>https://github.com/AsBackup/DAOSSA</a:t>
             </a:r>
             <a:r>
               <a:rPr kumimoji="0" lang="en-GB" altLang="zh-CN" sz="2000" b="1" i="0" u="none" strike="noStrike" kern="1200" cap="none" spc="0" normalizeH="0" baseline="0" noProof="0" dirty="0">
-                <a:ln>
-                  <a:noFill/>
-                </a:ln>
-                <a:solidFill>
-                  <a:prstClr val="black"/>
-                </a:solidFill>
-                <a:effectLst/>
-                <a:uLnTx/>
-                <a:uFillTx/>
-                <a:latin typeface="Times New Roman" panose="02020603050405020304" pitchFamily="18" charset="0"/>
-                <a:ea typeface="微软雅黑" panose="020B0503020204020204" pitchFamily="34" charset="-122"/>
-                <a:cs typeface="Times New Roman" panose="02020603050405020304" pitchFamily="18" charset="0"/>
-                <a:sym typeface="+mn-ea"/>
-              </a:rPr>
-              <a:t> </a:t>
-            </a:r>
-            <a:r>
-              <a:rPr kumimoji="0" lang="zh-CN" altLang="en-US" sz="2000" b="1" i="0" u="none" strike="noStrike" kern="1200" cap="none" spc="0" normalizeH="0" baseline="0" noProof="0" dirty="0">
                 <a:ln>
                   <a:noFill/>
                 </a:ln>
@@ -21362,10 +21342,10 @@
           <p:nvPr/>
         </p:nvPicPr>
         <p:blipFill>
-          <a:blip r:embed="rId3">
+          <a:blip r:embed="rId4">
             <a:extLst>
               <a:ext uri="{96DAC541-7B7A-43D3-8B79-37D633B846F1}">
-                <asvg:svgBlip xmlns:asvg="http://schemas.microsoft.com/office/drawing/2016/SVG/main" r:embed="rId4"/>
+                <asvg:svgBlip xmlns:asvg="http://schemas.microsoft.com/office/drawing/2016/SVG/main" r:embed="rId5"/>
               </a:ext>
             </a:extLst>
           </a:blip>
@@ -21397,7 +21377,7 @@
         </p:nvSpPr>
         <p:spPr>
           <a:xfrm>
-            <a:off x="8959020" y="3706318"/>
+            <a:off x="8357658" y="3628346"/>
             <a:ext cx="3126448" cy="461665"/>
           </a:xfrm>
           <a:prstGeom prst="rect">

</xml_diff>